<commit_message>
Updated Model Diagram (.pptx)
Now includes Avatar and Birthday.
</commit_message>
<xml_diff>
--- a/docs/diagrams/ModelComponentClassDiagram.pptx
+++ b/docs/diagrams/ModelComponentClassDiagram.pptx
@@ -126,6 +126,10 @@
 </p:presentation>
 </file>
 
+<file path=ppt/revisionInfo.xml><?xml version="1.0" encoding="utf-8"?>
+<p1510:revInfo xmlns:a="http://schemas.openxmlformats.org/drawingml/2006/main" xmlns:r="http://schemas.openxmlformats.org/officeDocument/2006/relationships" xmlns:p1510="http://schemas.microsoft.com/office/powerpoint/2015/10/main"/>
+</file>
+
 <file path=ppt/notesMasters/notesMaster1.xml><?xml version="1.0" encoding="utf-8"?>
 <p:notesMaster xmlns:a="http://schemas.openxmlformats.org/drawingml/2006/main" xmlns:r="http://schemas.openxmlformats.org/officeDocument/2006/relationships" xmlns:p="http://schemas.openxmlformats.org/presentationml/2006/main">
   <p:cSld>
@@ -208,7 +212,7 @@
           <a:p>
             <a:fld id="{F5CC4B3F-88C1-4FFA-B1B6-F41C21DC6924}" type="datetimeFigureOut">
               <a:rPr lang="en-US" smtClean="0"/>
-              <a:t>9/4/17</a:t>
+              <a:t>10/24/2017</a:t>
             </a:fld>
             <a:endParaRPr lang="en-US"/>
           </a:p>
@@ -272,38 +276,37 @@
           <a:p>
             <a:pPr lvl="0"/>
             <a:r>
-              <a:rPr lang="en-US" smtClean="0"/>
+              <a:rPr lang="en-US"/>
               <a:t>Click to edit Master text styles</a:t>
             </a:r>
           </a:p>
           <a:p>
             <a:pPr lvl="1"/>
             <a:r>
-              <a:rPr lang="en-US" smtClean="0"/>
+              <a:rPr lang="en-US"/>
               <a:t>Second level</a:t>
             </a:r>
           </a:p>
           <a:p>
             <a:pPr lvl="2"/>
             <a:r>
-              <a:rPr lang="en-US" smtClean="0"/>
+              <a:rPr lang="en-US"/>
               <a:t>Third level</a:t>
             </a:r>
           </a:p>
           <a:p>
             <a:pPr lvl="3"/>
             <a:r>
-              <a:rPr lang="en-US" smtClean="0"/>
+              <a:rPr lang="en-US"/>
               <a:t>Fourth level</a:t>
             </a:r>
           </a:p>
           <a:p>
             <a:pPr lvl="4"/>
             <a:r>
-              <a:rPr lang="en-US" smtClean="0"/>
+              <a:rPr lang="en-US"/>
               <a:t>Fifth level</a:t>
             </a:r>
-            <a:endParaRPr lang="en-US"/>
           </a:p>
         </p:txBody>
       </p:sp>
@@ -514,10 +517,9 @@
           <a:lstStyle/>
           <a:p>
             <a:r>
-              <a:rPr lang="en-US" smtClean="0"/>
+              <a:rPr lang="en-US"/>
               <a:t>Click to edit Master title style</a:t>
             </a:r>
-            <a:endParaRPr lang="en-US"/>
           </a:p>
         </p:txBody>
       </p:sp>
@@ -633,10 +635,9 @@
           </a:lstStyle>
           <a:p>
             <a:r>
-              <a:rPr lang="en-US" smtClean="0"/>
+              <a:rPr lang="en-US"/>
               <a:t>Click to edit Master subtitle style</a:t>
             </a:r>
-            <a:endParaRPr lang="en-US"/>
           </a:p>
         </p:txBody>
       </p:sp>
@@ -657,7 +658,7 @@
           <a:p>
             <a:fld id="{78C97017-6FC3-485B-9764-EAC9E56C1D49}" type="datetimeFigureOut">
               <a:rPr lang="en-US" smtClean="0"/>
-              <a:t>9/4/17</a:t>
+              <a:t>10/24/2017</a:t>
             </a:fld>
             <a:endParaRPr lang="en-US"/>
           </a:p>
@@ -751,10 +752,9 @@
           <a:lstStyle/>
           <a:p>
             <a:r>
-              <a:rPr lang="en-US" smtClean="0"/>
+              <a:rPr lang="en-US"/>
               <a:t>Click to edit Master title style</a:t>
             </a:r>
-            <a:endParaRPr lang="en-US"/>
           </a:p>
         </p:txBody>
       </p:sp>
@@ -775,38 +775,37 @@
           <a:p>
             <a:pPr lvl="0"/>
             <a:r>
-              <a:rPr lang="en-US" smtClean="0"/>
+              <a:rPr lang="en-US"/>
               <a:t>Click to edit Master text styles</a:t>
             </a:r>
           </a:p>
           <a:p>
             <a:pPr lvl="1"/>
             <a:r>
-              <a:rPr lang="en-US" smtClean="0"/>
+              <a:rPr lang="en-US"/>
               <a:t>Second level</a:t>
             </a:r>
           </a:p>
           <a:p>
             <a:pPr lvl="2"/>
             <a:r>
-              <a:rPr lang="en-US" smtClean="0"/>
+              <a:rPr lang="en-US"/>
               <a:t>Third level</a:t>
             </a:r>
           </a:p>
           <a:p>
             <a:pPr lvl="3"/>
             <a:r>
-              <a:rPr lang="en-US" smtClean="0"/>
+              <a:rPr lang="en-US"/>
               <a:t>Fourth level</a:t>
             </a:r>
           </a:p>
           <a:p>
             <a:pPr lvl="4"/>
             <a:r>
-              <a:rPr lang="en-US" smtClean="0"/>
+              <a:rPr lang="en-US"/>
               <a:t>Fifth level</a:t>
             </a:r>
-            <a:endParaRPr lang="en-US"/>
           </a:p>
         </p:txBody>
       </p:sp>
@@ -827,7 +826,7 @@
           <a:p>
             <a:fld id="{78C97017-6FC3-485B-9764-EAC9E56C1D49}" type="datetimeFigureOut">
               <a:rPr lang="en-US" smtClean="0"/>
-              <a:t>9/4/17</a:t>
+              <a:t>10/24/2017</a:t>
             </a:fld>
             <a:endParaRPr lang="en-US"/>
           </a:p>
@@ -926,10 +925,9 @@
           <a:lstStyle/>
           <a:p>
             <a:r>
-              <a:rPr lang="en-US" smtClean="0"/>
+              <a:rPr lang="en-US"/>
               <a:t>Click to edit Master title style</a:t>
             </a:r>
-            <a:endParaRPr lang="en-US"/>
           </a:p>
         </p:txBody>
       </p:sp>
@@ -955,38 +953,37 @@
           <a:p>
             <a:pPr lvl="0"/>
             <a:r>
-              <a:rPr lang="en-US" smtClean="0"/>
+              <a:rPr lang="en-US"/>
               <a:t>Click to edit Master text styles</a:t>
             </a:r>
           </a:p>
           <a:p>
             <a:pPr lvl="1"/>
             <a:r>
-              <a:rPr lang="en-US" smtClean="0"/>
+              <a:rPr lang="en-US"/>
               <a:t>Second level</a:t>
             </a:r>
           </a:p>
           <a:p>
             <a:pPr lvl="2"/>
             <a:r>
-              <a:rPr lang="en-US" smtClean="0"/>
+              <a:rPr lang="en-US"/>
               <a:t>Third level</a:t>
             </a:r>
           </a:p>
           <a:p>
             <a:pPr lvl="3"/>
             <a:r>
-              <a:rPr lang="en-US" smtClean="0"/>
+              <a:rPr lang="en-US"/>
               <a:t>Fourth level</a:t>
             </a:r>
           </a:p>
           <a:p>
             <a:pPr lvl="4"/>
             <a:r>
-              <a:rPr lang="en-US" smtClean="0"/>
+              <a:rPr lang="en-US"/>
               <a:t>Fifth level</a:t>
             </a:r>
-            <a:endParaRPr lang="en-US"/>
           </a:p>
         </p:txBody>
       </p:sp>
@@ -1007,7 +1004,7 @@
           <a:p>
             <a:fld id="{78C97017-6FC3-485B-9764-EAC9E56C1D49}" type="datetimeFigureOut">
               <a:rPr lang="en-US" smtClean="0"/>
-              <a:t>9/4/17</a:t>
+              <a:t>10/24/2017</a:t>
             </a:fld>
             <a:endParaRPr lang="en-US"/>
           </a:p>
@@ -1101,10 +1098,9 @@
           <a:lstStyle/>
           <a:p>
             <a:r>
-              <a:rPr lang="en-US" smtClean="0"/>
+              <a:rPr lang="en-US"/>
               <a:t>Click to edit Master title style</a:t>
             </a:r>
-            <a:endParaRPr lang="en-US"/>
           </a:p>
         </p:txBody>
       </p:sp>
@@ -1125,38 +1121,37 @@
           <a:p>
             <a:pPr lvl="0"/>
             <a:r>
-              <a:rPr lang="en-US" smtClean="0"/>
+              <a:rPr lang="en-US"/>
               <a:t>Click to edit Master text styles</a:t>
             </a:r>
           </a:p>
           <a:p>
             <a:pPr lvl="1"/>
             <a:r>
-              <a:rPr lang="en-US" smtClean="0"/>
+              <a:rPr lang="en-US"/>
               <a:t>Second level</a:t>
             </a:r>
           </a:p>
           <a:p>
             <a:pPr lvl="2"/>
             <a:r>
-              <a:rPr lang="en-US" smtClean="0"/>
+              <a:rPr lang="en-US"/>
               <a:t>Third level</a:t>
             </a:r>
           </a:p>
           <a:p>
             <a:pPr lvl="3"/>
             <a:r>
-              <a:rPr lang="en-US" smtClean="0"/>
+              <a:rPr lang="en-US"/>
               <a:t>Fourth level</a:t>
             </a:r>
           </a:p>
           <a:p>
             <a:pPr lvl="4"/>
             <a:r>
-              <a:rPr lang="en-US" smtClean="0"/>
+              <a:rPr lang="en-US"/>
               <a:t>Fifth level</a:t>
             </a:r>
-            <a:endParaRPr lang="en-US"/>
           </a:p>
         </p:txBody>
       </p:sp>
@@ -1177,7 +1172,7 @@
           <a:p>
             <a:fld id="{78C97017-6FC3-485B-9764-EAC9E56C1D49}" type="datetimeFigureOut">
               <a:rPr lang="en-US" smtClean="0"/>
-              <a:t>9/4/17</a:t>
+              <a:t>10/24/2017</a:t>
             </a:fld>
             <a:endParaRPr lang="en-US"/>
           </a:p>
@@ -1280,10 +1275,9 @@
           </a:lstStyle>
           <a:p>
             <a:r>
-              <a:rPr lang="en-US" smtClean="0"/>
+              <a:rPr lang="en-US"/>
               <a:t>Click to edit Master title style</a:t>
             </a:r>
-            <a:endParaRPr lang="en-US"/>
           </a:p>
         </p:txBody>
       </p:sp>
@@ -1400,7 +1394,7 @@
           <a:p>
             <a:pPr lvl="0"/>
             <a:r>
-              <a:rPr lang="en-US" smtClean="0"/>
+              <a:rPr lang="en-US"/>
               <a:t>Click to edit Master text styles</a:t>
             </a:r>
           </a:p>
@@ -1423,7 +1417,7 @@
           <a:p>
             <a:fld id="{78C97017-6FC3-485B-9764-EAC9E56C1D49}" type="datetimeFigureOut">
               <a:rPr lang="en-US" smtClean="0"/>
-              <a:t>9/4/17</a:t>
+              <a:t>10/24/2017</a:t>
             </a:fld>
             <a:endParaRPr lang="en-US"/>
           </a:p>
@@ -1517,10 +1511,9 @@
           <a:lstStyle/>
           <a:p>
             <a:r>
-              <a:rPr lang="en-US" smtClean="0"/>
+              <a:rPr lang="en-US"/>
               <a:t>Click to edit Master title style</a:t>
             </a:r>
-            <a:endParaRPr lang="en-US"/>
           </a:p>
         </p:txBody>
       </p:sp>
@@ -1574,38 +1567,37 @@
           <a:p>
             <a:pPr lvl="0"/>
             <a:r>
-              <a:rPr lang="en-US" smtClean="0"/>
+              <a:rPr lang="en-US"/>
               <a:t>Click to edit Master text styles</a:t>
             </a:r>
           </a:p>
           <a:p>
             <a:pPr lvl="1"/>
             <a:r>
-              <a:rPr lang="en-US" smtClean="0"/>
+              <a:rPr lang="en-US"/>
               <a:t>Second level</a:t>
             </a:r>
           </a:p>
           <a:p>
             <a:pPr lvl="2"/>
             <a:r>
-              <a:rPr lang="en-US" smtClean="0"/>
+              <a:rPr lang="en-US"/>
               <a:t>Third level</a:t>
             </a:r>
           </a:p>
           <a:p>
             <a:pPr lvl="3"/>
             <a:r>
-              <a:rPr lang="en-US" smtClean="0"/>
+              <a:rPr lang="en-US"/>
               <a:t>Fourth level</a:t>
             </a:r>
           </a:p>
           <a:p>
             <a:pPr lvl="4"/>
             <a:r>
-              <a:rPr lang="en-US" smtClean="0"/>
+              <a:rPr lang="en-US"/>
               <a:t>Fifth level</a:t>
             </a:r>
-            <a:endParaRPr lang="en-US"/>
           </a:p>
         </p:txBody>
       </p:sp>
@@ -1659,38 +1651,37 @@
           <a:p>
             <a:pPr lvl="0"/>
             <a:r>
-              <a:rPr lang="en-US" smtClean="0"/>
+              <a:rPr lang="en-US"/>
               <a:t>Click to edit Master text styles</a:t>
             </a:r>
           </a:p>
           <a:p>
             <a:pPr lvl="1"/>
             <a:r>
-              <a:rPr lang="en-US" smtClean="0"/>
+              <a:rPr lang="en-US"/>
               <a:t>Second level</a:t>
             </a:r>
           </a:p>
           <a:p>
             <a:pPr lvl="2"/>
             <a:r>
-              <a:rPr lang="en-US" smtClean="0"/>
+              <a:rPr lang="en-US"/>
               <a:t>Third level</a:t>
             </a:r>
           </a:p>
           <a:p>
             <a:pPr lvl="3"/>
             <a:r>
-              <a:rPr lang="en-US" smtClean="0"/>
+              <a:rPr lang="en-US"/>
               <a:t>Fourth level</a:t>
             </a:r>
           </a:p>
           <a:p>
             <a:pPr lvl="4"/>
             <a:r>
-              <a:rPr lang="en-US" smtClean="0"/>
+              <a:rPr lang="en-US"/>
               <a:t>Fifth level</a:t>
             </a:r>
-            <a:endParaRPr lang="en-US"/>
           </a:p>
         </p:txBody>
       </p:sp>
@@ -1711,7 +1702,7 @@
           <a:p>
             <a:fld id="{78C97017-6FC3-485B-9764-EAC9E56C1D49}" type="datetimeFigureOut">
               <a:rPr lang="en-US" smtClean="0"/>
-              <a:t>9/4/17</a:t>
+              <a:t>10/24/2017</a:t>
             </a:fld>
             <a:endParaRPr lang="en-US"/>
           </a:p>
@@ -1809,10 +1800,9 @@
           </a:lstStyle>
           <a:p>
             <a:r>
-              <a:rPr lang="en-US" smtClean="0"/>
+              <a:rPr lang="en-US"/>
               <a:t>Click to edit Master title style</a:t>
             </a:r>
-            <a:endParaRPr lang="en-US"/>
           </a:p>
         </p:txBody>
       </p:sp>
@@ -1875,7 +1865,7 @@
           <a:p>
             <a:pPr lvl="0"/>
             <a:r>
-              <a:rPr lang="en-US" smtClean="0"/>
+              <a:rPr lang="en-US"/>
               <a:t>Click to edit Master text styles</a:t>
             </a:r>
           </a:p>
@@ -1931,38 +1921,37 @@
           <a:p>
             <a:pPr lvl="0"/>
             <a:r>
-              <a:rPr lang="en-US" smtClean="0"/>
+              <a:rPr lang="en-US"/>
               <a:t>Click to edit Master text styles</a:t>
             </a:r>
           </a:p>
           <a:p>
             <a:pPr lvl="1"/>
             <a:r>
-              <a:rPr lang="en-US" smtClean="0"/>
+              <a:rPr lang="en-US"/>
               <a:t>Second level</a:t>
             </a:r>
           </a:p>
           <a:p>
             <a:pPr lvl="2"/>
             <a:r>
-              <a:rPr lang="en-US" smtClean="0"/>
+              <a:rPr lang="en-US"/>
               <a:t>Third level</a:t>
             </a:r>
           </a:p>
           <a:p>
             <a:pPr lvl="3"/>
             <a:r>
-              <a:rPr lang="en-US" smtClean="0"/>
+              <a:rPr lang="en-US"/>
               <a:t>Fourth level</a:t>
             </a:r>
           </a:p>
           <a:p>
             <a:pPr lvl="4"/>
             <a:r>
-              <a:rPr lang="en-US" smtClean="0"/>
+              <a:rPr lang="en-US"/>
               <a:t>Fifth level</a:t>
             </a:r>
-            <a:endParaRPr lang="en-US"/>
           </a:p>
         </p:txBody>
       </p:sp>
@@ -2025,7 +2014,7 @@
           <a:p>
             <a:pPr lvl="0"/>
             <a:r>
-              <a:rPr lang="en-US" smtClean="0"/>
+              <a:rPr lang="en-US"/>
               <a:t>Click to edit Master text styles</a:t>
             </a:r>
           </a:p>
@@ -2081,38 +2070,37 @@
           <a:p>
             <a:pPr lvl="0"/>
             <a:r>
-              <a:rPr lang="en-US" smtClean="0"/>
+              <a:rPr lang="en-US"/>
               <a:t>Click to edit Master text styles</a:t>
             </a:r>
           </a:p>
           <a:p>
             <a:pPr lvl="1"/>
             <a:r>
-              <a:rPr lang="en-US" smtClean="0"/>
+              <a:rPr lang="en-US"/>
               <a:t>Second level</a:t>
             </a:r>
           </a:p>
           <a:p>
             <a:pPr lvl="2"/>
             <a:r>
-              <a:rPr lang="en-US" smtClean="0"/>
+              <a:rPr lang="en-US"/>
               <a:t>Third level</a:t>
             </a:r>
           </a:p>
           <a:p>
             <a:pPr lvl="3"/>
             <a:r>
-              <a:rPr lang="en-US" smtClean="0"/>
+              <a:rPr lang="en-US"/>
               <a:t>Fourth level</a:t>
             </a:r>
           </a:p>
           <a:p>
             <a:pPr lvl="4"/>
             <a:r>
-              <a:rPr lang="en-US" smtClean="0"/>
+              <a:rPr lang="en-US"/>
               <a:t>Fifth level</a:t>
             </a:r>
-            <a:endParaRPr lang="en-US"/>
           </a:p>
         </p:txBody>
       </p:sp>
@@ -2133,7 +2121,7 @@
           <a:p>
             <a:fld id="{78C97017-6FC3-485B-9764-EAC9E56C1D49}" type="datetimeFigureOut">
               <a:rPr lang="en-US" smtClean="0"/>
-              <a:t>9/4/17</a:t>
+              <a:t>10/24/2017</a:t>
             </a:fld>
             <a:endParaRPr lang="en-US"/>
           </a:p>
@@ -2227,10 +2215,9 @@
           <a:lstStyle/>
           <a:p>
             <a:r>
-              <a:rPr lang="en-US" smtClean="0"/>
+              <a:rPr lang="en-US"/>
               <a:t>Click to edit Master title style</a:t>
             </a:r>
-            <a:endParaRPr lang="en-US"/>
           </a:p>
         </p:txBody>
       </p:sp>
@@ -2251,7 +2238,7 @@
           <a:p>
             <a:fld id="{78C97017-6FC3-485B-9764-EAC9E56C1D49}" type="datetimeFigureOut">
               <a:rPr lang="en-US" smtClean="0"/>
-              <a:t>9/4/17</a:t>
+              <a:t>10/24/2017</a:t>
             </a:fld>
             <a:endParaRPr lang="en-US"/>
           </a:p>
@@ -2346,7 +2333,7 @@
           <a:p>
             <a:fld id="{78C97017-6FC3-485B-9764-EAC9E56C1D49}" type="datetimeFigureOut">
               <a:rPr lang="en-US" smtClean="0"/>
-              <a:t>9/4/17</a:t>
+              <a:t>10/24/2017</a:t>
             </a:fld>
             <a:endParaRPr lang="en-US"/>
           </a:p>
@@ -2449,10 +2436,9 @@
           </a:lstStyle>
           <a:p>
             <a:r>
-              <a:rPr lang="en-US" smtClean="0"/>
+              <a:rPr lang="en-US"/>
               <a:t>Click to edit Master title style</a:t>
             </a:r>
-            <a:endParaRPr lang="en-US"/>
           </a:p>
         </p:txBody>
       </p:sp>
@@ -2506,38 +2492,37 @@
           <a:p>
             <a:pPr lvl="0"/>
             <a:r>
-              <a:rPr lang="en-US" smtClean="0"/>
+              <a:rPr lang="en-US"/>
               <a:t>Click to edit Master text styles</a:t>
             </a:r>
           </a:p>
           <a:p>
             <a:pPr lvl="1"/>
             <a:r>
-              <a:rPr lang="en-US" smtClean="0"/>
+              <a:rPr lang="en-US"/>
               <a:t>Second level</a:t>
             </a:r>
           </a:p>
           <a:p>
             <a:pPr lvl="2"/>
             <a:r>
-              <a:rPr lang="en-US" smtClean="0"/>
+              <a:rPr lang="en-US"/>
               <a:t>Third level</a:t>
             </a:r>
           </a:p>
           <a:p>
             <a:pPr lvl="3"/>
             <a:r>
-              <a:rPr lang="en-US" smtClean="0"/>
+              <a:rPr lang="en-US"/>
               <a:t>Fourth level</a:t>
             </a:r>
           </a:p>
           <a:p>
             <a:pPr lvl="4"/>
             <a:r>
-              <a:rPr lang="en-US" smtClean="0"/>
+              <a:rPr lang="en-US"/>
               <a:t>Fifth level</a:t>
             </a:r>
-            <a:endParaRPr lang="en-US"/>
           </a:p>
         </p:txBody>
       </p:sp>
@@ -2600,7 +2585,7 @@
           <a:p>
             <a:pPr lvl="0"/>
             <a:r>
-              <a:rPr lang="en-US" smtClean="0"/>
+              <a:rPr lang="en-US"/>
               <a:t>Click to edit Master text styles</a:t>
             </a:r>
           </a:p>
@@ -2623,7 +2608,7 @@
           <a:p>
             <a:fld id="{78C97017-6FC3-485B-9764-EAC9E56C1D49}" type="datetimeFigureOut">
               <a:rPr lang="en-US" smtClean="0"/>
-              <a:t>9/4/17</a:t>
+              <a:t>10/24/2017</a:t>
             </a:fld>
             <a:endParaRPr lang="en-US"/>
           </a:p>
@@ -2726,10 +2711,9 @@
           </a:lstStyle>
           <a:p>
             <a:r>
-              <a:rPr lang="en-US" smtClean="0"/>
+              <a:rPr lang="en-US"/>
               <a:t>Click to edit Master title style</a:t>
             </a:r>
-            <a:endParaRPr lang="en-US"/>
           </a:p>
         </p:txBody>
       </p:sp>
@@ -2853,7 +2837,7 @@
           <a:p>
             <a:pPr lvl="0"/>
             <a:r>
-              <a:rPr lang="en-US" smtClean="0"/>
+              <a:rPr lang="en-US"/>
               <a:t>Click to edit Master text styles</a:t>
             </a:r>
           </a:p>
@@ -2876,7 +2860,7 @@
           <a:p>
             <a:fld id="{78C97017-6FC3-485B-9764-EAC9E56C1D49}" type="datetimeFigureOut">
               <a:rPr lang="en-US" smtClean="0"/>
-              <a:t>9/4/17</a:t>
+              <a:t>10/24/2017</a:t>
             </a:fld>
             <a:endParaRPr lang="en-US"/>
           </a:p>
@@ -2985,10 +2969,9 @@
           <a:lstStyle/>
           <a:p>
             <a:r>
-              <a:rPr lang="en-US" smtClean="0"/>
+              <a:rPr lang="en-US"/>
               <a:t>Click to edit Master title style</a:t>
             </a:r>
-            <a:endParaRPr lang="en-US"/>
           </a:p>
         </p:txBody>
       </p:sp>
@@ -3019,38 +3002,37 @@
           <a:p>
             <a:pPr lvl="0"/>
             <a:r>
-              <a:rPr lang="en-US" smtClean="0"/>
+              <a:rPr lang="en-US"/>
               <a:t>Click to edit Master text styles</a:t>
             </a:r>
           </a:p>
           <a:p>
             <a:pPr lvl="1"/>
             <a:r>
-              <a:rPr lang="en-US" smtClean="0"/>
+              <a:rPr lang="en-US"/>
               <a:t>Second level</a:t>
             </a:r>
           </a:p>
           <a:p>
             <a:pPr lvl="2"/>
             <a:r>
-              <a:rPr lang="en-US" smtClean="0"/>
+              <a:rPr lang="en-US"/>
               <a:t>Third level</a:t>
             </a:r>
           </a:p>
           <a:p>
             <a:pPr lvl="3"/>
             <a:r>
-              <a:rPr lang="en-US" smtClean="0"/>
+              <a:rPr lang="en-US"/>
               <a:t>Fourth level</a:t>
             </a:r>
           </a:p>
           <a:p>
             <a:pPr lvl="4"/>
             <a:r>
-              <a:rPr lang="en-US" smtClean="0"/>
+              <a:rPr lang="en-US"/>
               <a:t>Fifth level</a:t>
             </a:r>
-            <a:endParaRPr lang="en-US"/>
           </a:p>
         </p:txBody>
       </p:sp>
@@ -3089,7 +3071,7 @@
           <a:p>
             <a:fld id="{78C97017-6FC3-485B-9764-EAC9E56C1D49}" type="datetimeFigureOut">
               <a:rPr lang="en-US" smtClean="0"/>
-              <a:t>9/4/17</a:t>
+              <a:t>10/24/2017</a:t>
             </a:fld>
             <a:endParaRPr lang="en-US"/>
           </a:p>
@@ -3510,7 +3492,7 @@
           <a:lstStyle/>
           <a:p>
             <a:r>
-              <a:rPr lang="en-US" sz="1200" b="1" dirty="0" smtClean="0">
+              <a:rPr lang="en-US" sz="1200" b="1" dirty="0">
                 <a:solidFill>
                   <a:srgbClr val="7030A0"/>
                 </a:solidFill>
@@ -3569,7 +3551,7 @@
           <a:p>
             <a:pPr algn="ctr"/>
             <a:r>
-              <a:rPr lang="en-US" sz="1050" dirty="0" err="1" smtClean="0">
+              <a:rPr lang="en-US" sz="1050" dirty="0" err="1">
                 <a:solidFill>
                   <a:schemeClr val="bg1"/>
                 </a:solidFill>
@@ -3628,7 +3610,7 @@
           <a:p>
             <a:pPr algn="ctr"/>
             <a:r>
-              <a:rPr lang="en-US" sz="1050" dirty="0" err="1" smtClean="0">
+              <a:rPr lang="en-US" sz="1050" dirty="0" err="1">
                 <a:solidFill>
                   <a:schemeClr val="bg1"/>
                 </a:solidFill>
@@ -3783,7 +3765,7 @@
           <a:p>
             <a:pPr algn="ctr"/>
             <a:r>
-              <a:rPr lang="en-US" sz="1050" dirty="0" smtClean="0">
+              <a:rPr lang="en-US" sz="1050" dirty="0">
                 <a:solidFill>
                   <a:schemeClr val="bg1"/>
                 </a:solidFill>
@@ -4107,7 +4089,7 @@
           <a:p>
             <a:pPr algn="ctr"/>
             <a:r>
-              <a:rPr lang="en-US" sz="1050" dirty="0" err="1" smtClean="0">
+              <a:rPr lang="en-US" sz="1050" dirty="0" err="1">
                 <a:solidFill>
                   <a:srgbClr val="7030A0"/>
                 </a:solidFill>
@@ -4249,7 +4231,7 @@
           <a:p>
             <a:pPr algn="ctr"/>
             <a:r>
-              <a:rPr lang="en-US" sz="1050" dirty="0" err="1" smtClean="0">
+              <a:rPr lang="en-US" sz="1050" dirty="0" err="1">
                 <a:solidFill>
                   <a:srgbClr val="7030A0"/>
                 </a:solidFill>
@@ -4393,7 +4375,7 @@
           <a:p>
             <a:pPr algn="ctr"/>
             <a:r>
-              <a:rPr lang="en-US" sz="1050" dirty="0" err="1" smtClean="0">
+              <a:rPr lang="en-US" sz="1050" dirty="0" err="1">
                 <a:solidFill>
                   <a:srgbClr val="7030A0"/>
                 </a:solidFill>
@@ -4492,7 +4474,7 @@
           <a:p>
             <a:pPr algn="ctr"/>
             <a:r>
-              <a:rPr lang="en-US" sz="1050" dirty="0" smtClean="0">
+              <a:rPr lang="en-US" sz="1050" dirty="0">
                 <a:solidFill>
                   <a:srgbClr val="7030A0"/>
                 </a:solidFill>
@@ -4634,7 +4616,7 @@
           <a:p>
             <a:pPr algn="ctr"/>
             <a:r>
-              <a:rPr lang="en-US" sz="1050" dirty="0" smtClean="0">
+              <a:rPr lang="en-US" sz="1050" dirty="0">
                 <a:solidFill>
                   <a:srgbClr val="7030A0"/>
                 </a:solidFill>
@@ -4776,7 +4758,7 @@
           <a:p>
             <a:pPr algn="ctr"/>
             <a:r>
-              <a:rPr lang="en-US" sz="1050" dirty="0" smtClean="0">
+              <a:rPr lang="en-US" sz="1050" dirty="0">
                 <a:solidFill>
                   <a:srgbClr val="7030A0"/>
                 </a:solidFill>
@@ -4784,14 +4766,14 @@
               <a:t>&lt;&lt;interface&gt;&gt;</a:t>
             </a:r>
             <a:br>
-              <a:rPr lang="en-US" sz="1050" dirty="0" smtClean="0">
+              <a:rPr lang="en-US" sz="1050" dirty="0">
                 <a:solidFill>
                   <a:srgbClr val="7030A0"/>
                 </a:solidFill>
               </a:rPr>
             </a:br>
             <a:r>
-              <a:rPr lang="en-US" sz="1050" dirty="0" err="1" smtClean="0">
+              <a:rPr lang="en-US" sz="1050" dirty="0" err="1">
                 <a:solidFill>
                   <a:srgbClr val="7030A0"/>
                 </a:solidFill>
@@ -4814,7 +4796,7 @@
         </p:nvSpPr>
         <p:spPr>
           <a:xfrm>
-            <a:off x="7712397" y="2564238"/>
+            <a:off x="7712397" y="2567413"/>
             <a:ext cx="708186" cy="285783"/>
           </a:xfrm>
           <a:prstGeom prst="rect">
@@ -4847,7 +4829,7 @@
           <a:p>
             <a:pPr algn="ctr"/>
             <a:r>
-              <a:rPr lang="en-US" sz="1050" dirty="0" smtClean="0">
+              <a:rPr lang="en-US" sz="1050" dirty="0">
                 <a:solidFill>
                   <a:srgbClr val="7030A0"/>
                 </a:solidFill>
@@ -4920,8 +4902,8 @@
         </p:nvCxnSpPr>
         <p:spPr>
           <a:xfrm flipV="1">
-            <a:off x="7277995" y="2707130"/>
-            <a:ext cx="434402" cy="327761"/>
+            <a:off x="7277995" y="2710305"/>
+            <a:ext cx="434402" cy="324586"/>
           </a:xfrm>
           <a:prstGeom prst="bentConnector3">
             <a:avLst/>
@@ -4958,7 +4940,7 @@
         </p:nvSpPr>
         <p:spPr>
           <a:xfrm>
-            <a:off x="7712397" y="2887216"/>
+            <a:off x="7712397" y="2890391"/>
             <a:ext cx="708186" cy="285783"/>
           </a:xfrm>
           <a:prstGeom prst="rect">
@@ -4991,7 +4973,7 @@
           <a:p>
             <a:pPr algn="ctr"/>
             <a:r>
-              <a:rPr lang="en-US" sz="1050" dirty="0" smtClean="0">
+              <a:rPr lang="en-US" sz="1050" dirty="0">
                 <a:solidFill>
                   <a:srgbClr val="7030A0"/>
                 </a:solidFill>
@@ -5010,6 +4992,7 @@
         <p:nvCxnSpPr>
           <p:cNvPr id="81" name="Elbow Connector 80"/>
           <p:cNvCxnSpPr>
+            <a:cxnSpLocks/>
             <a:stCxn id="78" idx="3"/>
             <a:endCxn id="80" idx="1"/>
           </p:cNvCxnSpPr>
@@ -5017,8 +5000,8 @@
         </p:nvCxnSpPr>
         <p:spPr>
           <a:xfrm flipV="1">
-            <a:off x="7277995" y="3030108"/>
-            <a:ext cx="434402" cy="4783"/>
+            <a:off x="7277995" y="3033283"/>
+            <a:ext cx="434402" cy="1608"/>
           </a:xfrm>
           <a:prstGeom prst="bentConnector3">
             <a:avLst/>
@@ -5055,7 +5038,7 @@
         </p:nvSpPr>
         <p:spPr>
           <a:xfrm>
-            <a:off x="7712397" y="3210194"/>
+            <a:off x="7712397" y="3213369"/>
             <a:ext cx="708186" cy="285783"/>
           </a:xfrm>
           <a:prstGeom prst="rect">
@@ -5088,7 +5071,7 @@
           <a:p>
             <a:pPr algn="ctr"/>
             <a:r>
-              <a:rPr lang="en-US" sz="1050" dirty="0" smtClean="0">
+              <a:rPr lang="en-US" sz="1050" dirty="0">
                 <a:solidFill>
                   <a:srgbClr val="7030A0"/>
                 </a:solidFill>
@@ -5115,7 +5098,7 @@
         <p:spPr>
           <a:xfrm>
             <a:off x="7277995" y="3034891"/>
-            <a:ext cx="434402" cy="318195"/>
+            <a:ext cx="434402" cy="321370"/>
           </a:xfrm>
           <a:prstGeom prst="bentConnector3">
             <a:avLst/>
@@ -5152,7 +5135,7 @@
         </p:nvSpPr>
         <p:spPr>
           <a:xfrm>
-            <a:off x="7712397" y="3533171"/>
+            <a:off x="7712397" y="3536346"/>
             <a:ext cx="708186" cy="285783"/>
           </a:xfrm>
           <a:prstGeom prst="rect">
@@ -5185,7 +5168,7 @@
           <a:p>
             <a:pPr algn="ctr"/>
             <a:r>
-              <a:rPr lang="en-US" sz="1050" dirty="0" smtClean="0">
+              <a:rPr lang="en-US" sz="1050" dirty="0">
                 <a:solidFill>
                   <a:srgbClr val="7030A0"/>
                 </a:solidFill>
@@ -5204,6 +5187,7 @@
         <p:nvCxnSpPr>
           <p:cNvPr id="86" name="Elbow Connector 85"/>
           <p:cNvCxnSpPr>
+            <a:cxnSpLocks/>
             <a:stCxn id="78" idx="3"/>
             <a:endCxn id="85" idx="1"/>
           </p:cNvCxnSpPr>
@@ -5212,7 +5196,7 @@
         <p:spPr>
           <a:xfrm>
             <a:off x="7277995" y="3034891"/>
-            <a:ext cx="434402" cy="641172"/>
+            <a:ext cx="434402" cy="644347"/>
           </a:xfrm>
           <a:prstGeom prst="bentConnector3">
             <a:avLst/>
@@ -5373,7 +5357,7 @@
           <a:p>
             <a:pPr algn="ctr"/>
             <a:r>
-              <a:rPr lang="en-US" sz="1050" dirty="0" smtClean="0">
+              <a:rPr lang="en-US" sz="1050" dirty="0">
                 <a:solidFill>
                   <a:srgbClr val="7030A0"/>
                 </a:solidFill>
@@ -5381,14 +5365,14 @@
               <a:t>&lt;&lt;interface&gt;&gt;</a:t>
             </a:r>
             <a:br>
-              <a:rPr lang="en-US" sz="1050" dirty="0" smtClean="0">
+              <a:rPr lang="en-US" sz="1050" dirty="0">
                 <a:solidFill>
                   <a:srgbClr val="7030A0"/>
                 </a:solidFill>
               </a:rPr>
             </a:br>
             <a:r>
-              <a:rPr lang="en-US" sz="1050" dirty="0" err="1" smtClean="0">
+              <a:rPr lang="en-US" sz="1050" dirty="0" err="1">
                 <a:solidFill>
                   <a:srgbClr val="7030A0"/>
                 </a:solidFill>
@@ -5427,7 +5411,7 @@
           <a:p>
             <a:pPr algn="r"/>
             <a:r>
-              <a:rPr lang="en-US" sz="1100" dirty="0" smtClean="0">
+              <a:rPr lang="en-US" sz="1100" dirty="0">
                 <a:solidFill>
                   <a:srgbClr val="7030A0"/>
                 </a:solidFill>
@@ -5483,20 +5467,12 @@
           <a:p>
             <a:pPr algn="ctr"/>
             <a:r>
-              <a:rPr lang="en-US" sz="1050" dirty="0" smtClean="0">
+              <a:rPr lang="en-US" sz="1050" dirty="0">
                 <a:solidFill>
                   <a:srgbClr val="7030A0"/>
                 </a:solidFill>
               </a:rPr>
               <a:t>&lt;&lt;interface&gt;&gt;</a:t>
-            </a:r>
-            <a:r>
-              <a:rPr lang="en-US" sz="1050">
-                <a:solidFill>
-                  <a:srgbClr val="7030A0"/>
-                </a:solidFill>
-              </a:rPr>
-              <a:t/>
             </a:r>
             <a:br>
               <a:rPr lang="en-US" sz="1050">
@@ -5506,7 +5482,7 @@
               </a:rPr>
             </a:br>
             <a:r>
-              <a:rPr lang="en-US" sz="1050" dirty="0" err="1" smtClean="0">
+              <a:rPr lang="en-US" sz="1050" dirty="0" err="1">
                 <a:solidFill>
                   <a:srgbClr val="7030A0"/>
                 </a:solidFill>
@@ -5628,7 +5604,7 @@
           <a:p>
             <a:pPr algn="ctr"/>
             <a:r>
-              <a:rPr lang="en-US" sz="1100" dirty="0" smtClean="0">
+              <a:rPr lang="en-US" sz="1100" dirty="0">
                 <a:solidFill>
                   <a:srgbClr val="7030A0"/>
                 </a:solidFill>
@@ -5667,7 +5643,7 @@
           <a:p>
             <a:pPr algn="ctr"/>
             <a:r>
-              <a:rPr lang="en-US" sz="1100" dirty="0" smtClean="0">
+              <a:rPr lang="en-US" sz="1100" dirty="0">
                 <a:solidFill>
                   <a:srgbClr val="7030A0"/>
                 </a:solidFill>
@@ -5706,7 +5682,7 @@
           <a:p>
             <a:pPr algn="ctr"/>
             <a:r>
-              <a:rPr lang="en-US" sz="1100" dirty="0" smtClean="0">
+              <a:rPr lang="en-US" sz="1100" dirty="0">
                 <a:solidFill>
                   <a:srgbClr val="7030A0"/>
                 </a:solidFill>
@@ -5745,7 +5721,7 @@
           <a:p>
             <a:pPr algn="ctr"/>
             <a:r>
-              <a:rPr lang="en-US" sz="1100" dirty="0" smtClean="0">
+              <a:rPr lang="en-US" sz="1100" dirty="0">
                 <a:solidFill>
                   <a:srgbClr val="7030A0"/>
                 </a:solidFill>
@@ -5784,7 +5760,7 @@
           <a:p>
             <a:pPr algn="ctr"/>
             <a:r>
-              <a:rPr lang="en-US" sz="1100" dirty="0" smtClean="0">
+              <a:rPr lang="en-US" sz="1100" dirty="0">
                 <a:solidFill>
                   <a:srgbClr val="7030A0"/>
                 </a:solidFill>
@@ -5823,7 +5799,7 @@
           <a:p>
             <a:pPr algn="ctr"/>
             <a:r>
-              <a:rPr lang="en-US" sz="1100" dirty="0" smtClean="0">
+              <a:rPr lang="en-US" sz="1100" dirty="0">
                 <a:solidFill>
                   <a:srgbClr val="7030A0"/>
                 </a:solidFill>
@@ -5862,7 +5838,7 @@
           <a:p>
             <a:pPr algn="ctr"/>
             <a:r>
-              <a:rPr lang="en-US" sz="1100" dirty="0" smtClean="0">
+              <a:rPr lang="en-US" sz="1100" dirty="0">
                 <a:solidFill>
                   <a:srgbClr val="7030A0"/>
                 </a:solidFill>
@@ -5901,7 +5877,7 @@
           <a:p>
             <a:pPr algn="ctr"/>
             <a:r>
-              <a:rPr lang="en-US" sz="1100" dirty="0" smtClean="0">
+              <a:rPr lang="en-US" sz="1100" dirty="0">
                 <a:solidFill>
                   <a:srgbClr val="7030A0"/>
                 </a:solidFill>
@@ -5916,6 +5892,222 @@
           </a:p>
         </p:txBody>
       </p:sp>
+      <p:sp>
+        <p:nvSpPr>
+          <p:cNvPr id="55" name="Rectangle 8">
+            <a:extLst>
+              <a:ext uri="{FF2B5EF4-FFF2-40B4-BE49-F238E27FC236}">
+                <a16:creationId xmlns:a16="http://schemas.microsoft.com/office/drawing/2014/main" id="{3DA7D5B4-EE47-4A6C-BD26-4EA7FC7A1DFE}"/>
+              </a:ext>
+            </a:extLst>
+          </p:cNvPr>
+          <p:cNvSpPr/>
+          <p:nvPr/>
+        </p:nvSpPr>
+        <p:spPr>
+          <a:xfrm>
+            <a:off x="7712397" y="3856152"/>
+            <a:ext cx="708186" cy="285783"/>
+          </a:xfrm>
+          <a:prstGeom prst="rect">
+            <a:avLst/>
+          </a:prstGeom>
+          <a:ln w="19050">
+            <a:solidFill>
+              <a:srgbClr val="7030A0"/>
+            </a:solidFill>
+          </a:ln>
+          <a:effectLst/>
+        </p:spPr>
+        <p:style>
+          <a:lnRef idx="1">
+            <a:schemeClr val="accent4"/>
+          </a:lnRef>
+          <a:fillRef idx="2">
+            <a:schemeClr val="accent4"/>
+          </a:fillRef>
+          <a:effectRef idx="1">
+            <a:schemeClr val="accent4"/>
+          </a:effectRef>
+          <a:fontRef idx="minor">
+            <a:schemeClr val="dk1"/>
+          </a:fontRef>
+        </p:style>
+        <p:txBody>
+          <a:bodyPr rtlCol="0" anchor="ctr"/>
+          <a:lstStyle/>
+          <a:p>
+            <a:pPr algn="ctr"/>
+            <a:r>
+              <a:rPr lang="en-US" sz="1050" dirty="0">
+                <a:solidFill>
+                  <a:srgbClr val="7030A0"/>
+                </a:solidFill>
+              </a:rPr>
+              <a:t>Birthday</a:t>
+            </a:r>
+            <a:endParaRPr lang="en-SG" sz="1050" dirty="0">
+              <a:solidFill>
+                <a:srgbClr val="7030A0"/>
+              </a:solidFill>
+            </a:endParaRPr>
+          </a:p>
+        </p:txBody>
+      </p:sp>
+      <p:sp>
+        <p:nvSpPr>
+          <p:cNvPr id="73" name="Rectangle 8">
+            <a:extLst>
+              <a:ext uri="{FF2B5EF4-FFF2-40B4-BE49-F238E27FC236}">
+                <a16:creationId xmlns:a16="http://schemas.microsoft.com/office/drawing/2014/main" id="{83EAE04A-D9A1-4785-90AA-89FE040D6E34}"/>
+              </a:ext>
+            </a:extLst>
+          </p:cNvPr>
+          <p:cNvSpPr/>
+          <p:nvPr/>
+        </p:nvSpPr>
+        <p:spPr>
+          <a:xfrm>
+            <a:off x="7712397" y="4175958"/>
+            <a:ext cx="708186" cy="285783"/>
+          </a:xfrm>
+          <a:prstGeom prst="rect">
+            <a:avLst/>
+          </a:prstGeom>
+          <a:ln w="19050">
+            <a:solidFill>
+              <a:srgbClr val="7030A0"/>
+            </a:solidFill>
+          </a:ln>
+          <a:effectLst/>
+        </p:spPr>
+        <p:style>
+          <a:lnRef idx="1">
+            <a:schemeClr val="accent4"/>
+          </a:lnRef>
+          <a:fillRef idx="2">
+            <a:schemeClr val="accent4"/>
+          </a:fillRef>
+          <a:effectRef idx="1">
+            <a:schemeClr val="accent4"/>
+          </a:effectRef>
+          <a:fontRef idx="minor">
+            <a:schemeClr val="dk1"/>
+          </a:fontRef>
+        </p:style>
+        <p:txBody>
+          <a:bodyPr rtlCol="0" anchor="ctr"/>
+          <a:lstStyle/>
+          <a:p>
+            <a:pPr algn="ctr"/>
+            <a:r>
+              <a:rPr lang="en-US" sz="1050" dirty="0">
+                <a:solidFill>
+                  <a:srgbClr val="7030A0"/>
+                </a:solidFill>
+              </a:rPr>
+              <a:t>Avatar</a:t>
+            </a:r>
+            <a:endParaRPr lang="en-SG" sz="1050" dirty="0">
+              <a:solidFill>
+                <a:srgbClr val="7030A0"/>
+              </a:solidFill>
+            </a:endParaRPr>
+          </a:p>
+        </p:txBody>
+      </p:sp>
+      <p:cxnSp>
+        <p:nvCxnSpPr>
+          <p:cNvPr id="74" name="Elbow Connector 85">
+            <a:extLst>
+              <a:ext uri="{FF2B5EF4-FFF2-40B4-BE49-F238E27FC236}">
+                <a16:creationId xmlns:a16="http://schemas.microsoft.com/office/drawing/2014/main" id="{FF3595B6-E358-426F-B6A4-BD67D3322BF8}"/>
+              </a:ext>
+            </a:extLst>
+          </p:cNvPr>
+          <p:cNvCxnSpPr>
+            <a:cxnSpLocks/>
+          </p:cNvCxnSpPr>
+          <p:nvPr/>
+        </p:nvCxnSpPr>
+        <p:spPr>
+          <a:xfrm rot="16200000" flipH="1">
+            <a:off x="7446863" y="3726046"/>
+            <a:ext cx="321368" cy="224627"/>
+          </a:xfrm>
+          <a:prstGeom prst="bentConnector2">
+            <a:avLst/>
+          </a:prstGeom>
+          <a:ln w="19050">
+            <a:solidFill>
+              <a:srgbClr val="7030A0"/>
+            </a:solidFill>
+            <a:headEnd type="none" w="med" len="med"/>
+            <a:tailEnd type="arrow" w="med" len="med"/>
+          </a:ln>
+          <a:effectLst/>
+        </p:spPr>
+        <p:style>
+          <a:lnRef idx="1">
+            <a:schemeClr val="accent2"/>
+          </a:lnRef>
+          <a:fillRef idx="2">
+            <a:schemeClr val="accent2"/>
+          </a:fillRef>
+          <a:effectRef idx="1">
+            <a:schemeClr val="accent2"/>
+          </a:effectRef>
+          <a:fontRef idx="minor">
+            <a:schemeClr val="dk1"/>
+          </a:fontRef>
+        </p:style>
+      </p:cxnSp>
+      <p:cxnSp>
+        <p:nvCxnSpPr>
+          <p:cNvPr id="77" name="Elbow Connector 85">
+            <a:extLst>
+              <a:ext uri="{FF2B5EF4-FFF2-40B4-BE49-F238E27FC236}">
+                <a16:creationId xmlns:a16="http://schemas.microsoft.com/office/drawing/2014/main" id="{F70B311F-92D4-471F-BFCB-18AB02ED6C0E}"/>
+              </a:ext>
+            </a:extLst>
+          </p:cNvPr>
+          <p:cNvCxnSpPr>
+            <a:cxnSpLocks/>
+          </p:cNvCxnSpPr>
+          <p:nvPr/>
+        </p:nvCxnSpPr>
+        <p:spPr>
+          <a:xfrm rot="16200000" flipH="1">
+            <a:off x="7446540" y="4052232"/>
+            <a:ext cx="321368" cy="224627"/>
+          </a:xfrm>
+          <a:prstGeom prst="bentConnector2">
+            <a:avLst/>
+          </a:prstGeom>
+          <a:ln w="19050">
+            <a:solidFill>
+              <a:srgbClr val="7030A0"/>
+            </a:solidFill>
+            <a:headEnd type="none" w="med" len="med"/>
+            <a:tailEnd type="arrow" w="med" len="med"/>
+          </a:ln>
+          <a:effectLst/>
+        </p:spPr>
+        <p:style>
+          <a:lnRef idx="1">
+            <a:schemeClr val="accent2"/>
+          </a:lnRef>
+          <a:fillRef idx="2">
+            <a:schemeClr val="accent2"/>
+          </a:fillRef>
+          <a:effectRef idx="1">
+            <a:schemeClr val="accent2"/>
+          </a:effectRef>
+          <a:fontRef idx="minor">
+            <a:schemeClr val="dk1"/>
+          </a:fontRef>
+        </p:style>
+      </p:cxnSp>
     </p:spTree>
     <p:extLst>
       <p:ext uri="{BB962C8B-B14F-4D97-AF65-F5344CB8AC3E}">
@@ -5926,13 +6118,6 @@
   <p:clrMapOvr>
     <a:masterClrMapping/>
   </p:clrMapOvr>
-  <p:timing>
-    <p:tnLst>
-      <p:par>
-        <p:cTn id="1" dur="indefinite" restart="never" nodeType="tmRoot"/>
-      </p:par>
-    </p:tnLst>
-  </p:timing>
 </p:sld>
 </file>
 

</xml_diff>